<commit_message>
updated tagline on presentation
</commit_message>
<xml_diff>
--- a/Presentation.pptx
+++ b/Presentation.pptx
@@ -137,12 +137,12 @@
   <pc:docChgLst>
     <pc:chgData name="Lyss Hochberger" userId="4fa3960b-d31c-430b-b8ed-4775cbfd1dc8" providerId="ADAL" clId="{AF7CCB12-6846-405E-A2A0-4227DFA6B391}"/>
     <pc:docChg chg="undo custSel mod modSld addSection">
-      <pc:chgData name="Lyss Hochberger" userId="4fa3960b-d31c-430b-b8ed-4775cbfd1dc8" providerId="ADAL" clId="{AF7CCB12-6846-405E-A2A0-4227DFA6B391}" dt="2020-04-25T01:26:57.987" v="456" actId="20577"/>
+      <pc:chgData name="Lyss Hochberger" userId="4fa3960b-d31c-430b-b8ed-4775cbfd1dc8" providerId="ADAL" clId="{AF7CCB12-6846-405E-A2A0-4227DFA6B391}" dt="2020-04-25T01:54:18.309" v="568" actId="20577"/>
       <pc:docMkLst>
         <pc:docMk/>
       </pc:docMkLst>
       <pc:sldChg chg="addSp delSp modSp mod setBg delDesignElem">
-        <pc:chgData name="Lyss Hochberger" userId="4fa3960b-d31c-430b-b8ed-4775cbfd1dc8" providerId="ADAL" clId="{AF7CCB12-6846-405E-A2A0-4227DFA6B391}" dt="2020-04-25T01:26:57.987" v="456" actId="20577"/>
+        <pc:chgData name="Lyss Hochberger" userId="4fa3960b-d31c-430b-b8ed-4775cbfd1dc8" providerId="ADAL" clId="{AF7CCB12-6846-405E-A2A0-4227DFA6B391}" dt="2020-04-25T01:54:18.309" v="568" actId="20577"/>
         <pc:sldMkLst>
           <pc:docMk/>
           <pc:sldMk cId="2416289024" sldId="256"/>
@@ -188,7 +188,7 @@
           </ac:spMkLst>
         </pc:spChg>
         <pc:spChg chg="add mod">
-          <ac:chgData name="Lyss Hochberger" userId="4fa3960b-d31c-430b-b8ed-4775cbfd1dc8" providerId="ADAL" clId="{AF7CCB12-6846-405E-A2A0-4227DFA6B391}" dt="2020-04-25T01:26:57.987" v="456" actId="20577"/>
+          <ac:chgData name="Lyss Hochberger" userId="4fa3960b-d31c-430b-b8ed-4775cbfd1dc8" providerId="ADAL" clId="{AF7CCB12-6846-405E-A2A0-4227DFA6B391}" dt="2020-04-25T01:54:18.309" v="568" actId="20577"/>
           <ac:spMkLst>
             <pc:docMk/>
             <pc:sldMk cId="2416289024" sldId="256"/>
@@ -6506,16 +6506,13 @@
             <a:pPr algn="ctr"/>
             <a:r>
               <a:rPr lang="en-US" sz="2400" dirty="0"/>
-              <a:t>Be in the known of </a:t>
+              <a:t>Collect and total users bills with the information </a:t>
             </a:r>
             <a:r>
               <a:rPr lang="en-US" sz="2400"/>
-              <a:t>your total monthly </a:t>
-            </a:r>
-            <a:r>
-              <a:rPr lang="en-US" sz="2400" dirty="0"/>
-              <a:t>costs in bills</a:t>
-            </a:r>
+              <a:t>users provide</a:t>
+            </a:r>
+            <a:endParaRPr lang="en-US" sz="2400" dirty="0"/>
           </a:p>
         </p:txBody>
       </p:sp>
@@ -6784,6 +6781,12 @@
 </file>
 
 <file path=customXml/item2.xml><?xml version="1.0" encoding="utf-8"?>
+<p:properties xmlns:p="http://schemas.microsoft.com/office/2006/metadata/properties" xmlns:xsi="http://www.w3.org/2001/XMLSchema-instance" xmlns:pc="http://schemas.microsoft.com/office/infopath/2007/PartnerControls">
+  <documentManagement/>
+</p:properties>
+</file>
+
+<file path=customXml/item3.xml><?xml version="1.0" encoding="utf-8"?>
 <ct:contentTypeSchema xmlns:ct="http://schemas.microsoft.com/office/2006/metadata/contentType" xmlns:ma="http://schemas.microsoft.com/office/2006/metadata/properties/metaAttributes" ct:_="" ma:_="" ma:contentTypeName="Document" ma:contentTypeID="0x0101003BB3022E7208D14A8F4F8DEF517DED51" ma:contentTypeVersion="9" ma:contentTypeDescription="Create a new document." ma:contentTypeScope="" ma:versionID="cb23d4ecc99bed08d037e587cc153d7b">
   <xsd:schema xmlns:xsd="http://www.w3.org/2001/XMLSchema" xmlns:xs="http://www.w3.org/2001/XMLSchema" xmlns:p="http://schemas.microsoft.com/office/2006/metadata/properties" xmlns:ns3="60b643d8-c1ac-4dd6-8c7a-b21acb26a88f" targetNamespace="http://schemas.microsoft.com/office/2006/metadata/properties" ma:root="true" ma:fieldsID="6b0bd2e187c2fdf688e4ad6aabf8b7fc" ns3:_="">
     <xsd:import namespace="60b643d8-c1ac-4dd6-8c7a-b21acb26a88f"/>
@@ -6961,12 +6964,6 @@
 </ct:contentTypeSchema>
 </file>
 
-<file path=customXml/item3.xml><?xml version="1.0" encoding="utf-8"?>
-<p:properties xmlns:p="http://schemas.microsoft.com/office/2006/metadata/properties" xmlns:xsi="http://www.w3.org/2001/XMLSchema-instance" xmlns:pc="http://schemas.microsoft.com/office/infopath/2007/PartnerControls">
-  <documentManagement/>
-</p:properties>
-</file>
-
 <file path=customXml/itemProps1.xml><?xml version="1.0" encoding="utf-8"?>
 <ds:datastoreItem xmlns:ds="http://schemas.openxmlformats.org/officeDocument/2006/customXml" ds:itemID="{7289178B-E47E-4F29-8121-687C52F69F14}">
   <ds:schemaRefs>
@@ -6976,6 +6973,15 @@
 </file>
 
 <file path=customXml/itemProps2.xml><?xml version="1.0" encoding="utf-8"?>
+<ds:datastoreItem xmlns:ds="http://schemas.openxmlformats.org/officeDocument/2006/customXml" ds:itemID="{B08F2113-79DC-46F7-A0AE-CC578319CA07}">
+  <ds:schemaRefs>
+    <ds:schemaRef ds:uri="http://schemas.microsoft.com/office/2006/metadata/properties"/>
+    <ds:schemaRef ds:uri="http://schemas.microsoft.com/office/infopath/2007/PartnerControls"/>
+  </ds:schemaRefs>
+</ds:datastoreItem>
+</file>
+
+<file path=customXml/itemProps3.xml><?xml version="1.0" encoding="utf-8"?>
 <ds:datastoreItem xmlns:ds="http://schemas.openxmlformats.org/officeDocument/2006/customXml" ds:itemID="{3E168219-0E10-46D2-9F0D-C2854F486C5E}">
   <ds:schemaRefs>
     <ds:schemaRef ds:uri="http://schemas.microsoft.com/office/2006/metadata/contentType"/>
@@ -6991,13 +6997,4 @@
     <ds:schemaRef ds:uri="http://schemas.microsoft.com/internal/obd"/>
   </ds:schemaRefs>
 </ds:datastoreItem>
-</file>
-
-<file path=customXml/itemProps3.xml><?xml version="1.0" encoding="utf-8"?>
-<ds:datastoreItem xmlns:ds="http://schemas.openxmlformats.org/officeDocument/2006/customXml" ds:itemID="{B08F2113-79DC-46F7-A0AE-CC578319CA07}">
-  <ds:schemaRefs>
-    <ds:schemaRef ds:uri="http://schemas.microsoft.com/office/2006/metadata/properties"/>
-    <ds:schemaRef ds:uri="http://schemas.microsoft.com/office/infopath/2007/PartnerControls"/>
-  </ds:schemaRefs>
-</ds:datastoreItem>
 </file>
</xml_diff>